<commit_message>
- More styling fixes on Encounter List. - All working?
</commit_message>
<xml_diff>
--- a/Layout.pptx
+++ b/Layout.pptx
@@ -243,7 +243,7 @@
           <a:p>
             <a:fld id="{A23FB1A9-4EFB-4FFF-922D-DBDC5C08C402}" type="datetimeFigureOut">
               <a:rPr lang="en-US" smtClean="0"/>
-              <a:t>4/15/2016</a:t>
+              <a:t>4/18/2016</a:t>
             </a:fld>
             <a:endParaRPr lang="en-US"/>
           </a:p>
@@ -413,7 +413,7 @@
           <a:p>
             <a:fld id="{A23FB1A9-4EFB-4FFF-922D-DBDC5C08C402}" type="datetimeFigureOut">
               <a:rPr lang="en-US" smtClean="0"/>
-              <a:t>4/15/2016</a:t>
+              <a:t>4/18/2016</a:t>
             </a:fld>
             <a:endParaRPr lang="en-US"/>
           </a:p>
@@ -593,7 +593,7 @@
           <a:p>
             <a:fld id="{A23FB1A9-4EFB-4FFF-922D-DBDC5C08C402}" type="datetimeFigureOut">
               <a:rPr lang="en-US" smtClean="0"/>
-              <a:t>4/15/2016</a:t>
+              <a:t>4/18/2016</a:t>
             </a:fld>
             <a:endParaRPr lang="en-US"/>
           </a:p>
@@ -763,7 +763,7 @@
           <a:p>
             <a:fld id="{A23FB1A9-4EFB-4FFF-922D-DBDC5C08C402}" type="datetimeFigureOut">
               <a:rPr lang="en-US" smtClean="0"/>
-              <a:t>4/15/2016</a:t>
+              <a:t>4/18/2016</a:t>
             </a:fld>
             <a:endParaRPr lang="en-US"/>
           </a:p>
@@ -1009,7 +1009,7 @@
           <a:p>
             <a:fld id="{A23FB1A9-4EFB-4FFF-922D-DBDC5C08C402}" type="datetimeFigureOut">
               <a:rPr lang="en-US" smtClean="0"/>
-              <a:t>4/15/2016</a:t>
+              <a:t>4/18/2016</a:t>
             </a:fld>
             <a:endParaRPr lang="en-US"/>
           </a:p>
@@ -1241,7 +1241,7 @@
           <a:p>
             <a:fld id="{A23FB1A9-4EFB-4FFF-922D-DBDC5C08C402}" type="datetimeFigureOut">
               <a:rPr lang="en-US" smtClean="0"/>
-              <a:t>4/15/2016</a:t>
+              <a:t>4/18/2016</a:t>
             </a:fld>
             <a:endParaRPr lang="en-US"/>
           </a:p>
@@ -1608,7 +1608,7 @@
           <a:p>
             <a:fld id="{A23FB1A9-4EFB-4FFF-922D-DBDC5C08C402}" type="datetimeFigureOut">
               <a:rPr lang="en-US" smtClean="0"/>
-              <a:t>4/15/2016</a:t>
+              <a:t>4/18/2016</a:t>
             </a:fld>
             <a:endParaRPr lang="en-US"/>
           </a:p>
@@ -1726,7 +1726,7 @@
           <a:p>
             <a:fld id="{A23FB1A9-4EFB-4FFF-922D-DBDC5C08C402}" type="datetimeFigureOut">
               <a:rPr lang="en-US" smtClean="0"/>
-              <a:t>4/15/2016</a:t>
+              <a:t>4/18/2016</a:t>
             </a:fld>
             <a:endParaRPr lang="en-US"/>
           </a:p>
@@ -1821,7 +1821,7 @@
           <a:p>
             <a:fld id="{A23FB1A9-4EFB-4FFF-922D-DBDC5C08C402}" type="datetimeFigureOut">
               <a:rPr lang="en-US" smtClean="0"/>
-              <a:t>4/15/2016</a:t>
+              <a:t>4/18/2016</a:t>
             </a:fld>
             <a:endParaRPr lang="en-US"/>
           </a:p>
@@ -2098,7 +2098,7 @@
           <a:p>
             <a:fld id="{A23FB1A9-4EFB-4FFF-922D-DBDC5C08C402}" type="datetimeFigureOut">
               <a:rPr lang="en-US" smtClean="0"/>
-              <a:t>4/15/2016</a:t>
+              <a:t>4/18/2016</a:t>
             </a:fld>
             <a:endParaRPr lang="en-US"/>
           </a:p>
@@ -2351,7 +2351,7 @@
           <a:p>
             <a:fld id="{A23FB1A9-4EFB-4FFF-922D-DBDC5C08C402}" type="datetimeFigureOut">
               <a:rPr lang="en-US" smtClean="0"/>
-              <a:t>4/15/2016</a:t>
+              <a:t>4/18/2016</a:t>
             </a:fld>
             <a:endParaRPr lang="en-US"/>
           </a:p>
@@ -2564,7 +2564,7 @@
           <a:p>
             <a:fld id="{A23FB1A9-4EFB-4FFF-922D-DBDC5C08C402}" type="datetimeFigureOut">
               <a:rPr lang="en-US" smtClean="0"/>
-              <a:t>4/15/2016</a:t>
+              <a:t>4/18/2016</a:t>
             </a:fld>
             <a:endParaRPr lang="en-US"/>
           </a:p>
@@ -3340,105 +3340,6 @@
           </a:prstGeom>
           <a:solidFill>
             <a:srgbClr val="EFB867"/>
-          </a:solidFill>
-          <a:ln>
-            <a:noFill/>
-          </a:ln>
-        </p:spPr>
-        <p:style>
-          <a:lnRef idx="2">
-            <a:schemeClr val="accent1">
-              <a:shade val="50000"/>
-            </a:schemeClr>
-          </a:lnRef>
-          <a:fillRef idx="1">
-            <a:schemeClr val="accent1"/>
-          </a:fillRef>
-          <a:effectRef idx="0">
-            <a:schemeClr val="accent1"/>
-          </a:effectRef>
-          <a:fontRef idx="minor">
-            <a:schemeClr val="lt1"/>
-          </a:fontRef>
-        </p:style>
-        <p:txBody>
-          <a:bodyPr rtlCol="0" anchor="ctr"/>
-          <a:lstStyle/>
-          <a:p>
-            <a:pPr algn="ctr"/>
-            <a:endParaRPr lang="en-US"/>
-          </a:p>
-        </p:txBody>
-      </p:sp>
-      <p:sp>
-        <p:nvSpPr>
-          <p:cNvPr id="9" name="Rectangle 8"/>
-          <p:cNvSpPr/>
-          <p:nvPr/>
-        </p:nvSpPr>
-        <p:spPr>
-          <a:xfrm>
-            <a:off x="5573426" y="2546657"/>
-            <a:ext cx="2576463" cy="1652864"/>
-          </a:xfrm>
-          <a:prstGeom prst="rect">
-            <a:avLst/>
-          </a:prstGeom>
-          <a:solidFill>
-            <a:srgbClr val="F8E1BE"/>
-          </a:solidFill>
-          <a:ln>
-            <a:noFill/>
-          </a:ln>
-          <a:effectLst>
-            <a:outerShdw blurRad="50800" dist="38100" dir="5400000" algn="t" rotWithShape="0">
-              <a:prstClr val="black">
-                <a:alpha val="40000"/>
-              </a:prstClr>
-            </a:outerShdw>
-          </a:effectLst>
-        </p:spPr>
-        <p:style>
-          <a:lnRef idx="2">
-            <a:schemeClr val="accent1">
-              <a:shade val="50000"/>
-            </a:schemeClr>
-          </a:lnRef>
-          <a:fillRef idx="1">
-            <a:schemeClr val="accent1"/>
-          </a:fillRef>
-          <a:effectRef idx="0">
-            <a:schemeClr val="accent1"/>
-          </a:effectRef>
-          <a:fontRef idx="minor">
-            <a:schemeClr val="lt1"/>
-          </a:fontRef>
-        </p:style>
-        <p:txBody>
-          <a:bodyPr rtlCol="0" anchor="ctr"/>
-          <a:lstStyle/>
-          <a:p>
-            <a:pPr algn="ctr"/>
-            <a:endParaRPr lang="en-US"/>
-          </a:p>
-        </p:txBody>
-      </p:sp>
-      <p:sp>
-        <p:nvSpPr>
-          <p:cNvPr id="14" name="Rectangle 13"/>
-          <p:cNvSpPr/>
-          <p:nvPr/>
-        </p:nvSpPr>
-        <p:spPr>
-          <a:xfrm>
-            <a:off x="5657537" y="3101695"/>
-            <a:ext cx="1170432" cy="1003112"/>
-          </a:xfrm>
-          <a:prstGeom prst="rect">
-            <a:avLst/>
-          </a:prstGeom>
-          <a:solidFill>
-            <a:srgbClr val="F3CB91"/>
           </a:solidFill>
           <a:ln>
             <a:noFill/>
@@ -5299,144 +5200,6 @@
       </p:grpSp>
       <p:sp>
         <p:nvSpPr>
-          <p:cNvPr id="64" name="Rectangle 63"/>
-          <p:cNvSpPr/>
-          <p:nvPr/>
-        </p:nvSpPr>
-        <p:spPr>
-          <a:xfrm>
-            <a:off x="6903713" y="3101695"/>
-            <a:ext cx="1170432" cy="1003112"/>
-          </a:xfrm>
-          <a:prstGeom prst="rect">
-            <a:avLst/>
-          </a:prstGeom>
-          <a:solidFill>
-            <a:srgbClr val="F3CB91"/>
-          </a:solidFill>
-          <a:ln>
-            <a:noFill/>
-          </a:ln>
-        </p:spPr>
-        <p:style>
-          <a:lnRef idx="2">
-            <a:schemeClr val="accent1">
-              <a:shade val="50000"/>
-            </a:schemeClr>
-          </a:lnRef>
-          <a:fillRef idx="1">
-            <a:schemeClr val="accent1"/>
-          </a:fillRef>
-          <a:effectRef idx="0">
-            <a:schemeClr val="accent1"/>
-          </a:effectRef>
-          <a:fontRef idx="minor">
-            <a:schemeClr val="lt1"/>
-          </a:fontRef>
-        </p:style>
-        <p:txBody>
-          <a:bodyPr rtlCol="0" anchor="ctr"/>
-          <a:lstStyle/>
-          <a:p>
-            <a:pPr algn="ctr"/>
-            <a:endParaRPr lang="en-US"/>
-          </a:p>
-        </p:txBody>
-      </p:sp>
-      <p:sp>
-        <p:nvSpPr>
-          <p:cNvPr id="65" name="Rectangle 64"/>
-          <p:cNvSpPr/>
-          <p:nvPr/>
-        </p:nvSpPr>
-        <p:spPr>
-          <a:xfrm>
-            <a:off x="5657537" y="2765049"/>
-            <a:ext cx="1170432" cy="241932"/>
-          </a:xfrm>
-          <a:prstGeom prst="rect">
-            <a:avLst/>
-          </a:prstGeom>
-          <a:solidFill>
-            <a:srgbClr val="F3CB91"/>
-          </a:solidFill>
-          <a:ln>
-            <a:noFill/>
-          </a:ln>
-        </p:spPr>
-        <p:style>
-          <a:lnRef idx="2">
-            <a:schemeClr val="accent1">
-              <a:shade val="50000"/>
-            </a:schemeClr>
-          </a:lnRef>
-          <a:fillRef idx="1">
-            <a:schemeClr val="accent1"/>
-          </a:fillRef>
-          <a:effectRef idx="0">
-            <a:schemeClr val="accent1"/>
-          </a:effectRef>
-          <a:fontRef idx="minor">
-            <a:schemeClr val="lt1"/>
-          </a:fontRef>
-        </p:style>
-        <p:txBody>
-          <a:bodyPr rtlCol="0" anchor="ctr"/>
-          <a:lstStyle/>
-          <a:p>
-            <a:pPr algn="ctr"/>
-            <a:endParaRPr lang="en-US"/>
-          </a:p>
-        </p:txBody>
-      </p:sp>
-      <p:sp>
-        <p:nvSpPr>
-          <p:cNvPr id="66" name="Rectangle 65"/>
-          <p:cNvSpPr/>
-          <p:nvPr/>
-        </p:nvSpPr>
-        <p:spPr>
-          <a:xfrm>
-            <a:off x="6903713" y="2765049"/>
-            <a:ext cx="1170432" cy="241932"/>
-          </a:xfrm>
-          <a:prstGeom prst="rect">
-            <a:avLst/>
-          </a:prstGeom>
-          <a:solidFill>
-            <a:srgbClr val="F3CB91"/>
-          </a:solidFill>
-          <a:ln>
-            <a:noFill/>
-          </a:ln>
-        </p:spPr>
-        <p:style>
-          <a:lnRef idx="2">
-            <a:schemeClr val="accent1">
-              <a:shade val="50000"/>
-            </a:schemeClr>
-          </a:lnRef>
-          <a:fillRef idx="1">
-            <a:schemeClr val="accent1"/>
-          </a:fillRef>
-          <a:effectRef idx="0">
-            <a:schemeClr val="accent1"/>
-          </a:effectRef>
-          <a:fontRef idx="minor">
-            <a:schemeClr val="lt1"/>
-          </a:fontRef>
-        </p:style>
-        <p:txBody>
-          <a:bodyPr rtlCol="0" anchor="ctr"/>
-          <a:lstStyle/>
-          <a:p>
-            <a:pPr algn="ctr"/>
-            <a:endParaRPr lang="en-US"/>
-          </a:p>
-        </p:txBody>
-      </p:sp>
-      <p:sp>
-        <p:nvSpPr>
           <p:cNvPr id="67" name="Right Arrow 66"/>
           <p:cNvSpPr/>
           <p:nvPr/>
@@ -5484,14 +5247,14 @@
       </p:sp>
       <p:sp>
         <p:nvSpPr>
-          <p:cNvPr id="72" name="Rectangle 71"/>
+          <p:cNvPr id="77" name="Rectangle 76"/>
           <p:cNvSpPr/>
           <p:nvPr/>
         </p:nvSpPr>
         <p:spPr>
           <a:xfrm>
-            <a:off x="5573426" y="4392722"/>
-            <a:ext cx="2576463" cy="1652864"/>
+            <a:off x="5448301" y="440174"/>
+            <a:ext cx="2819400" cy="842525"/>
           </a:xfrm>
           <a:prstGeom prst="rect">
             <a:avLst/>
@@ -5537,250 +5300,13 @@
       </p:sp>
       <p:sp>
         <p:nvSpPr>
-          <p:cNvPr id="73" name="Rectangle 72"/>
-          <p:cNvSpPr/>
-          <p:nvPr/>
-        </p:nvSpPr>
-        <p:spPr>
-          <a:xfrm>
-            <a:off x="5657537" y="4947760"/>
-            <a:ext cx="1170432" cy="1003112"/>
-          </a:xfrm>
-          <a:prstGeom prst="rect">
-            <a:avLst/>
-          </a:prstGeom>
-          <a:solidFill>
-            <a:srgbClr val="F3CB91"/>
-          </a:solidFill>
-          <a:ln>
-            <a:noFill/>
-          </a:ln>
-        </p:spPr>
-        <p:style>
-          <a:lnRef idx="2">
-            <a:schemeClr val="accent1">
-              <a:shade val="50000"/>
-            </a:schemeClr>
-          </a:lnRef>
-          <a:fillRef idx="1">
-            <a:schemeClr val="accent1"/>
-          </a:fillRef>
-          <a:effectRef idx="0">
-            <a:schemeClr val="accent1"/>
-          </a:effectRef>
-          <a:fontRef idx="minor">
-            <a:schemeClr val="lt1"/>
-          </a:fontRef>
-        </p:style>
-        <p:txBody>
-          <a:bodyPr rtlCol="0" anchor="ctr"/>
-          <a:lstStyle/>
-          <a:p>
-            <a:pPr algn="ctr"/>
-            <a:endParaRPr lang="en-US"/>
-          </a:p>
-        </p:txBody>
-      </p:sp>
-      <p:sp>
-        <p:nvSpPr>
-          <p:cNvPr id="74" name="Rectangle 73"/>
-          <p:cNvSpPr/>
-          <p:nvPr/>
-        </p:nvSpPr>
-        <p:spPr>
-          <a:xfrm>
-            <a:off x="6903713" y="4947760"/>
-            <a:ext cx="1170432" cy="1003112"/>
-          </a:xfrm>
-          <a:prstGeom prst="rect">
-            <a:avLst/>
-          </a:prstGeom>
-          <a:solidFill>
-            <a:srgbClr val="F3CB91"/>
-          </a:solidFill>
-          <a:ln>
-            <a:noFill/>
-          </a:ln>
-        </p:spPr>
-        <p:style>
-          <a:lnRef idx="2">
-            <a:schemeClr val="accent1">
-              <a:shade val="50000"/>
-            </a:schemeClr>
-          </a:lnRef>
-          <a:fillRef idx="1">
-            <a:schemeClr val="accent1"/>
-          </a:fillRef>
-          <a:effectRef idx="0">
-            <a:schemeClr val="accent1"/>
-          </a:effectRef>
-          <a:fontRef idx="minor">
-            <a:schemeClr val="lt1"/>
-          </a:fontRef>
-        </p:style>
-        <p:txBody>
-          <a:bodyPr rtlCol="0" anchor="ctr"/>
-          <a:lstStyle/>
-          <a:p>
-            <a:pPr algn="ctr"/>
-            <a:endParaRPr lang="en-US"/>
-          </a:p>
-        </p:txBody>
-      </p:sp>
-      <p:sp>
-        <p:nvSpPr>
-          <p:cNvPr id="75" name="Rectangle 74"/>
-          <p:cNvSpPr/>
-          <p:nvPr/>
-        </p:nvSpPr>
-        <p:spPr>
-          <a:xfrm>
-            <a:off x="5657537" y="4611114"/>
-            <a:ext cx="1170432" cy="241932"/>
-          </a:xfrm>
-          <a:prstGeom prst="rect">
-            <a:avLst/>
-          </a:prstGeom>
-          <a:solidFill>
-            <a:srgbClr val="F3CB91"/>
-          </a:solidFill>
-          <a:ln>
-            <a:noFill/>
-          </a:ln>
-        </p:spPr>
-        <p:style>
-          <a:lnRef idx="2">
-            <a:schemeClr val="accent1">
-              <a:shade val="50000"/>
-            </a:schemeClr>
-          </a:lnRef>
-          <a:fillRef idx="1">
-            <a:schemeClr val="accent1"/>
-          </a:fillRef>
-          <a:effectRef idx="0">
-            <a:schemeClr val="accent1"/>
-          </a:effectRef>
-          <a:fontRef idx="minor">
-            <a:schemeClr val="lt1"/>
-          </a:fontRef>
-        </p:style>
-        <p:txBody>
-          <a:bodyPr rtlCol="0" anchor="ctr"/>
-          <a:lstStyle/>
-          <a:p>
-            <a:pPr algn="ctr"/>
-            <a:endParaRPr lang="en-US"/>
-          </a:p>
-        </p:txBody>
-      </p:sp>
-      <p:sp>
-        <p:nvSpPr>
-          <p:cNvPr id="76" name="Rectangle 75"/>
-          <p:cNvSpPr/>
-          <p:nvPr/>
-        </p:nvSpPr>
-        <p:spPr>
-          <a:xfrm>
-            <a:off x="6903713" y="4611114"/>
-            <a:ext cx="1170432" cy="241932"/>
-          </a:xfrm>
-          <a:prstGeom prst="rect">
-            <a:avLst/>
-          </a:prstGeom>
-          <a:solidFill>
-            <a:srgbClr val="F3CB91"/>
-          </a:solidFill>
-          <a:ln>
-            <a:noFill/>
-          </a:ln>
-        </p:spPr>
-        <p:style>
-          <a:lnRef idx="2">
-            <a:schemeClr val="accent1">
-              <a:shade val="50000"/>
-            </a:schemeClr>
-          </a:lnRef>
-          <a:fillRef idx="1">
-            <a:schemeClr val="accent1"/>
-          </a:fillRef>
-          <a:effectRef idx="0">
-            <a:schemeClr val="accent1"/>
-          </a:effectRef>
-          <a:fontRef idx="minor">
-            <a:schemeClr val="lt1"/>
-          </a:fontRef>
-        </p:style>
-        <p:txBody>
-          <a:bodyPr rtlCol="0" anchor="ctr"/>
-          <a:lstStyle/>
-          <a:p>
-            <a:pPr algn="ctr"/>
-            <a:endParaRPr lang="en-US"/>
-          </a:p>
-        </p:txBody>
-      </p:sp>
-      <p:sp>
-        <p:nvSpPr>
-          <p:cNvPr id="77" name="Rectangle 76"/>
-          <p:cNvSpPr/>
-          <p:nvPr/>
-        </p:nvSpPr>
-        <p:spPr>
-          <a:xfrm>
-            <a:off x="5448301" y="440174"/>
-            <a:ext cx="2819400" cy="842525"/>
-          </a:xfrm>
-          <a:prstGeom prst="rect">
-            <a:avLst/>
-          </a:prstGeom>
-          <a:solidFill>
-            <a:srgbClr val="F8E1BE"/>
-          </a:solidFill>
-          <a:ln>
-            <a:noFill/>
-          </a:ln>
-          <a:effectLst>
-            <a:outerShdw blurRad="50800" dist="38100" dir="5400000" algn="t" rotWithShape="0">
-              <a:prstClr val="black">
-                <a:alpha val="40000"/>
-              </a:prstClr>
-            </a:outerShdw>
-          </a:effectLst>
-        </p:spPr>
-        <p:style>
-          <a:lnRef idx="2">
-            <a:schemeClr val="accent1">
-              <a:shade val="50000"/>
-            </a:schemeClr>
-          </a:lnRef>
-          <a:fillRef idx="1">
-            <a:schemeClr val="accent1"/>
-          </a:fillRef>
-          <a:effectRef idx="0">
-            <a:schemeClr val="accent1"/>
-          </a:effectRef>
-          <a:fontRef idx="minor">
-            <a:schemeClr val="lt1"/>
-          </a:fontRef>
-        </p:style>
-        <p:txBody>
-          <a:bodyPr rtlCol="0" anchor="ctr"/>
-          <a:lstStyle/>
-          <a:p>
-            <a:pPr algn="ctr"/>
-            <a:endParaRPr lang="en-US"/>
-          </a:p>
-        </p:txBody>
-      </p:sp>
-      <p:sp>
-        <p:nvSpPr>
           <p:cNvPr id="79" name="Rectangle 78"/>
           <p:cNvSpPr/>
           <p:nvPr/>
         </p:nvSpPr>
         <p:spPr>
           <a:xfrm>
-            <a:off x="5461001" y="1666404"/>
+            <a:off x="5457044" y="1666404"/>
             <a:ext cx="2819400" cy="784695"/>
           </a:xfrm>
           <a:prstGeom prst="rect">
@@ -7126,7 +6652,7 @@
           <a:lstStyle/>
           <a:p>
             <a:r>
-              <a:rPr lang="en-US" sz="1400" b="1" dirty="0" smtClean="0">
+              <a:rPr lang="en-US" sz="1400" b="1" cap="small" dirty="0" smtClean="0">
                 <a:solidFill>
                   <a:srgbClr val="58180D"/>
                 </a:solidFill>
@@ -7134,7 +6660,7 @@
               </a:rPr>
               <a:t>Monster Name</a:t>
             </a:r>
-            <a:endParaRPr lang="en-US" sz="1400" b="1" dirty="0">
+            <a:endParaRPr lang="en-US" sz="1400" b="1" cap="small" dirty="0">
               <a:solidFill>
                 <a:srgbClr val="58180D"/>
               </a:solidFill>
@@ -9540,11 +9066,6 @@
               </a:rPr>
               <a:t>Hard</a:t>
             </a:r>
-            <a:endParaRPr lang="en-US" sz="1200" b="1" dirty="0">
-              <a:solidFill>
-                <a:schemeClr val="bg1"/>
-              </a:solidFill>
-            </a:endParaRPr>
           </a:p>
         </p:txBody>
       </p:sp>
@@ -9605,10 +9126,855 @@
               </a:rPr>
               <a:t>Deadly</a:t>
             </a:r>
+          </a:p>
+        </p:txBody>
+      </p:sp>
+      <p:sp>
+        <p:nvSpPr>
+          <p:cNvPr id="151" name="Rectangle 150"/>
+          <p:cNvSpPr/>
+          <p:nvPr/>
+        </p:nvSpPr>
+        <p:spPr>
+          <a:xfrm>
+            <a:off x="5495825" y="2575652"/>
+            <a:ext cx="2743106" cy="1696312"/>
+          </a:xfrm>
+          <a:prstGeom prst="rect">
+            <a:avLst/>
+          </a:prstGeom>
+          <a:solidFill>
+            <a:srgbClr val="800000"/>
+          </a:solidFill>
+          <a:ln>
+            <a:noFill/>
+          </a:ln>
+          <a:effectLst>
+            <a:outerShdw blurRad="50800" dist="38100" dir="5400000" algn="t" rotWithShape="0">
+              <a:prstClr val="black">
+                <a:alpha val="40000"/>
+              </a:prstClr>
+            </a:outerShdw>
+          </a:effectLst>
+        </p:spPr>
+        <p:style>
+          <a:lnRef idx="2">
+            <a:schemeClr val="accent1">
+              <a:shade val="50000"/>
+            </a:schemeClr>
+          </a:lnRef>
+          <a:fillRef idx="1">
+            <a:schemeClr val="accent1"/>
+          </a:fillRef>
+          <a:effectRef idx="0">
+            <a:schemeClr val="accent1"/>
+          </a:effectRef>
+          <a:fontRef idx="minor">
+            <a:schemeClr val="lt1"/>
+          </a:fontRef>
+        </p:style>
+        <p:txBody>
+          <a:bodyPr rtlCol="0" anchor="ctr"/>
+          <a:lstStyle/>
+          <a:p>
+            <a:pPr algn="ctr"/>
+            <a:endParaRPr lang="en-US"/>
+          </a:p>
+        </p:txBody>
+      </p:sp>
+      <p:sp>
+        <p:nvSpPr>
+          <p:cNvPr id="143" name="Rectangle 142"/>
+          <p:cNvSpPr/>
+          <p:nvPr/>
+        </p:nvSpPr>
+        <p:spPr>
+          <a:xfrm>
+            <a:off x="5539186" y="2905767"/>
+            <a:ext cx="1308579" cy="1323333"/>
+          </a:xfrm>
+          <a:prstGeom prst="rect">
+            <a:avLst/>
+          </a:prstGeom>
+          <a:solidFill>
+            <a:srgbClr val="F8E1BE"/>
+          </a:solidFill>
+          <a:ln>
+            <a:noFill/>
+          </a:ln>
+        </p:spPr>
+        <p:style>
+          <a:lnRef idx="2">
+            <a:schemeClr val="accent1">
+              <a:shade val="50000"/>
+            </a:schemeClr>
+          </a:lnRef>
+          <a:fillRef idx="1">
+            <a:schemeClr val="accent1"/>
+          </a:fillRef>
+          <a:effectRef idx="0">
+            <a:schemeClr val="accent1"/>
+          </a:effectRef>
+          <a:fontRef idx="minor">
+            <a:schemeClr val="lt1"/>
+          </a:fontRef>
+        </p:style>
+        <p:txBody>
+          <a:bodyPr rtlCol="0" anchor="ctr"/>
+          <a:lstStyle/>
+          <a:p>
+            <a:endParaRPr lang="en-US" sz="1200" b="1" dirty="0" smtClean="0">
+              <a:solidFill>
+                <a:srgbClr val="58180D"/>
+              </a:solidFill>
+            </a:endParaRPr>
+          </a:p>
+          <a:p>
+            <a:r>
+              <a:rPr lang="en-US" sz="1200" b="1" dirty="0" smtClean="0">
+                <a:solidFill>
+                  <a:srgbClr val="58180D"/>
+                </a:solidFill>
+              </a:rPr>
+              <a:t>Challenge</a:t>
+            </a:r>
+            <a:r>
+              <a:rPr lang="en-US" sz="1200" b="1" dirty="0">
+                <a:solidFill>
+                  <a:srgbClr val="58180D"/>
+                </a:solidFill>
+              </a:rPr>
+              <a:t>:</a:t>
+            </a:r>
+          </a:p>
+          <a:p>
+            <a:r>
+              <a:rPr lang="en-US" sz="1200" b="1" dirty="0">
+                <a:solidFill>
+                  <a:srgbClr val="58180D"/>
+                </a:solidFill>
+              </a:rPr>
+              <a:t>Armor Class:</a:t>
+            </a:r>
+          </a:p>
+          <a:p>
+            <a:r>
+              <a:rPr lang="en-US" sz="1200" b="1" dirty="0">
+                <a:solidFill>
+                  <a:srgbClr val="58180D"/>
+                </a:solidFill>
+              </a:rPr>
+              <a:t>Hit </a:t>
+            </a:r>
+            <a:r>
+              <a:rPr lang="en-US" sz="1200" b="1" dirty="0">
+                <a:solidFill>
+                  <a:srgbClr val="58180D"/>
+                </a:solidFill>
+              </a:rPr>
+              <a:t>Points</a:t>
+            </a:r>
+            <a:r>
+              <a:rPr lang="en-US" sz="1200" b="1" dirty="0">
+                <a:solidFill>
+                  <a:srgbClr val="58180D"/>
+                </a:solidFill>
+              </a:rPr>
+              <a:t>:</a:t>
+            </a:r>
+          </a:p>
+          <a:p>
+            <a:r>
+              <a:rPr lang="en-US" sz="1200" b="1" dirty="0">
+                <a:solidFill>
+                  <a:srgbClr val="58180D"/>
+                </a:solidFill>
+              </a:rPr>
+              <a:t>Attack Bonus:</a:t>
+            </a:r>
+          </a:p>
+          <a:p>
+            <a:r>
+              <a:rPr lang="en-US" sz="1200" b="1" dirty="0" smtClean="0">
+                <a:solidFill>
+                  <a:srgbClr val="58180D"/>
+                </a:solidFill>
+              </a:rPr>
+              <a:t>Damage:</a:t>
+            </a:r>
             <a:endParaRPr lang="en-US" sz="1200" b="1" dirty="0">
+              <a:solidFill>
+                <a:srgbClr val="58180D"/>
+              </a:solidFill>
+            </a:endParaRPr>
+          </a:p>
+        </p:txBody>
+      </p:sp>
+      <p:sp>
+        <p:nvSpPr>
+          <p:cNvPr id="145" name="Rectangle 144"/>
+          <p:cNvSpPr/>
+          <p:nvPr/>
+        </p:nvSpPr>
+        <p:spPr>
+          <a:xfrm>
+            <a:off x="5539187" y="2905768"/>
+            <a:ext cx="1308578" cy="241932"/>
+          </a:xfrm>
+          <a:prstGeom prst="rect">
+            <a:avLst/>
+          </a:prstGeom>
+          <a:solidFill>
+            <a:srgbClr val="EFB867"/>
+          </a:solidFill>
+          <a:ln>
+            <a:noFill/>
+          </a:ln>
+          <a:effectLst>
+            <a:outerShdw blurRad="50800" dist="38100" dir="5400000" algn="t" rotWithShape="0">
+              <a:prstClr val="black">
+                <a:alpha val="40000"/>
+              </a:prstClr>
+            </a:outerShdw>
+          </a:effectLst>
+        </p:spPr>
+        <p:style>
+          <a:lnRef idx="2">
+            <a:schemeClr val="accent1">
+              <a:shade val="50000"/>
+            </a:schemeClr>
+          </a:lnRef>
+          <a:fillRef idx="1">
+            <a:schemeClr val="accent1"/>
+          </a:fillRef>
+          <a:effectRef idx="0">
+            <a:schemeClr val="accent1"/>
+          </a:effectRef>
+          <a:fontRef idx="minor">
+            <a:schemeClr val="lt1"/>
+          </a:fontRef>
+        </p:style>
+        <p:txBody>
+          <a:bodyPr lIns="91440" tIns="0" rIns="0" bIns="0" rtlCol="0" anchor="ctr"/>
+          <a:lstStyle/>
+          <a:p>
+            <a:r>
+              <a:rPr lang="en-US" sz="1200" b="1" dirty="0" smtClean="0">
+                <a:solidFill>
+                  <a:schemeClr val="tx1"/>
+                </a:solidFill>
+                <a:latin typeface="Constantia" panose="02030602050306030303" pitchFamily="18" charset="0"/>
+              </a:rPr>
+              <a:t>Count: </a:t>
+            </a:r>
+            <a:r>
+              <a:rPr lang="en-US" sz="1200" b="1" dirty="0" smtClean="0">
+                <a:solidFill>
+                  <a:schemeClr val="tx1"/>
+                </a:solidFill>
+              </a:rPr>
+              <a:t>4</a:t>
+            </a:r>
+            <a:endParaRPr lang="en-US" sz="1200" b="1" dirty="0">
+              <a:solidFill>
+                <a:schemeClr val="tx1"/>
+              </a:solidFill>
+            </a:endParaRPr>
+          </a:p>
+        </p:txBody>
+      </p:sp>
+      <p:sp>
+        <p:nvSpPr>
+          <p:cNvPr id="147" name="Rectangle 146"/>
+          <p:cNvSpPr/>
+          <p:nvPr/>
+        </p:nvSpPr>
+        <p:spPr>
+          <a:xfrm>
+            <a:off x="6409044" y="2906655"/>
+            <a:ext cx="219456" cy="219456"/>
+          </a:xfrm>
+          <a:prstGeom prst="rect">
+            <a:avLst/>
+          </a:prstGeom>
+          <a:solidFill>
+            <a:srgbClr val="F3CB91"/>
+          </a:solidFill>
+          <a:ln>
+            <a:noFill/>
+          </a:ln>
+          <a:effectLst>
+            <a:outerShdw blurRad="50800" dist="38100" dir="5400000" algn="t" rotWithShape="0">
+              <a:prstClr val="black">
+                <a:alpha val="40000"/>
+              </a:prstClr>
+            </a:outerShdw>
+          </a:effectLst>
+        </p:spPr>
+        <p:style>
+          <a:lnRef idx="2">
+            <a:schemeClr val="accent1">
+              <a:shade val="50000"/>
+            </a:schemeClr>
+          </a:lnRef>
+          <a:fillRef idx="1">
+            <a:schemeClr val="accent1"/>
+          </a:fillRef>
+          <a:effectRef idx="0">
+            <a:schemeClr val="accent1"/>
+          </a:effectRef>
+          <a:fontRef idx="minor">
+            <a:schemeClr val="lt1"/>
+          </a:fontRef>
+        </p:style>
+        <p:txBody>
+          <a:bodyPr rtlCol="0" anchor="ctr"/>
+          <a:lstStyle/>
+          <a:p>
+            <a:pPr algn="ctr"/>
+            <a:r>
+              <a:rPr lang="en-US" b="1" dirty="0">
+                <a:solidFill>
+                  <a:schemeClr val="tx1"/>
+                </a:solidFill>
+              </a:rPr>
+              <a:t>+</a:t>
+            </a:r>
+          </a:p>
+        </p:txBody>
+      </p:sp>
+      <p:sp>
+        <p:nvSpPr>
+          <p:cNvPr id="148" name="Rectangle 147"/>
+          <p:cNvSpPr/>
+          <p:nvPr/>
+        </p:nvSpPr>
+        <p:spPr>
+          <a:xfrm>
+            <a:off x="6628309" y="2906654"/>
+            <a:ext cx="219456" cy="219456"/>
+          </a:xfrm>
+          <a:prstGeom prst="rect">
+            <a:avLst/>
+          </a:prstGeom>
+          <a:solidFill>
+            <a:srgbClr val="F3CB91"/>
+          </a:solidFill>
+          <a:ln>
+            <a:noFill/>
+          </a:ln>
+          <a:effectLst>
+            <a:outerShdw blurRad="50800" dist="38100" dir="5400000" algn="t" rotWithShape="0">
+              <a:prstClr val="black">
+                <a:alpha val="40000"/>
+              </a:prstClr>
+            </a:outerShdw>
+          </a:effectLst>
+        </p:spPr>
+        <p:style>
+          <a:lnRef idx="2">
+            <a:schemeClr val="accent1">
+              <a:shade val="50000"/>
+            </a:schemeClr>
+          </a:lnRef>
+          <a:fillRef idx="1">
+            <a:schemeClr val="accent1"/>
+          </a:fillRef>
+          <a:effectRef idx="0">
+            <a:schemeClr val="accent1"/>
+          </a:effectRef>
+          <a:fontRef idx="minor">
+            <a:schemeClr val="lt1"/>
+          </a:fontRef>
+        </p:style>
+        <p:txBody>
+          <a:bodyPr rtlCol="0" anchor="ctr"/>
+          <a:lstStyle/>
+          <a:p>
+            <a:pPr algn="ctr"/>
+            <a:r>
+              <a:rPr lang="en-US" b="1" dirty="0">
+                <a:solidFill>
+                  <a:schemeClr val="tx1"/>
+                </a:solidFill>
+              </a:rPr>
+              <a:t>-</a:t>
+            </a:r>
+          </a:p>
+        </p:txBody>
+      </p:sp>
+      <p:sp>
+        <p:nvSpPr>
+          <p:cNvPr id="142" name="Rectangle 141"/>
+          <p:cNvSpPr/>
+          <p:nvPr/>
+        </p:nvSpPr>
+        <p:spPr>
+          <a:xfrm>
+            <a:off x="5495191" y="2574291"/>
+            <a:ext cx="2743106" cy="308173"/>
+          </a:xfrm>
+          <a:prstGeom prst="rect">
+            <a:avLst/>
+          </a:prstGeom>
+          <a:solidFill>
+            <a:srgbClr val="990000"/>
+          </a:solidFill>
+          <a:ln>
+            <a:noFill/>
+          </a:ln>
+          <a:effectLst>
+            <a:outerShdw blurRad="50800" dist="38100" dir="5400000" algn="t" rotWithShape="0">
+              <a:prstClr val="black">
+                <a:alpha val="40000"/>
+              </a:prstClr>
+            </a:outerShdw>
+          </a:effectLst>
+        </p:spPr>
+        <p:style>
+          <a:lnRef idx="2">
+            <a:schemeClr val="accent1">
+              <a:shade val="50000"/>
+            </a:schemeClr>
+          </a:lnRef>
+          <a:fillRef idx="1">
+            <a:schemeClr val="accent1"/>
+          </a:fillRef>
+          <a:effectRef idx="0">
+            <a:schemeClr val="accent1"/>
+          </a:effectRef>
+          <a:fontRef idx="minor">
+            <a:schemeClr val="lt1"/>
+          </a:fontRef>
+        </p:style>
+        <p:txBody>
+          <a:bodyPr rtlCol="0" anchor="ctr"/>
+          <a:lstStyle/>
+          <a:p>
+            <a:pPr algn="ctr"/>
+            <a:endParaRPr lang="en-US"/>
+          </a:p>
+        </p:txBody>
+      </p:sp>
+      <p:sp>
+        <p:nvSpPr>
+          <p:cNvPr id="10" name="Rectangle 9"/>
+          <p:cNvSpPr/>
+          <p:nvPr/>
+        </p:nvSpPr>
+        <p:spPr>
+          <a:xfrm>
+            <a:off x="5502061" y="2592433"/>
+            <a:ext cx="1778307" cy="276999"/>
+          </a:xfrm>
+          <a:prstGeom prst="rect">
+            <a:avLst/>
+          </a:prstGeom>
+        </p:spPr>
+        <p:txBody>
+          <a:bodyPr wrap="none" tIns="0" bIns="0">
+            <a:spAutoFit/>
+          </a:bodyPr>
+          <a:lstStyle/>
+          <a:p>
+            <a:r>
+              <a:rPr lang="en-US" b="1" cap="small" dirty="0">
+                <a:solidFill>
+                  <a:schemeClr val="bg1"/>
+                </a:solidFill>
+                <a:effectLst>
+                  <a:outerShdw blurRad="50800" dist="38100" dir="5400000" algn="t" rotWithShape="0">
+                    <a:prstClr val="black">
+                      <a:alpha val="40000"/>
+                    </a:prstClr>
+                  </a:outerShdw>
+                </a:effectLst>
+                <a:latin typeface="Constantia" panose="02030602050306030303" pitchFamily="18" charset="0"/>
+              </a:rPr>
+              <a:t>Monster Name</a:t>
+            </a:r>
+            <a:endParaRPr lang="en-US" b="1" cap="small" dirty="0">
               <a:solidFill>
                 <a:schemeClr val="bg1"/>
               </a:solidFill>
+              <a:effectLst>
+                <a:outerShdw blurRad="50800" dist="38100" dir="5400000" algn="t" rotWithShape="0">
+                  <a:prstClr val="black">
+                    <a:alpha val="40000"/>
+                  </a:prstClr>
+                </a:outerShdw>
+              </a:effectLst>
+              <a:latin typeface="Constantia" panose="02030602050306030303" pitchFamily="18" charset="0"/>
+            </a:endParaRPr>
+          </a:p>
+        </p:txBody>
+      </p:sp>
+      <p:sp>
+        <p:nvSpPr>
+          <p:cNvPr id="149" name="Rectangle 148"/>
+          <p:cNvSpPr/>
+          <p:nvPr/>
+        </p:nvSpPr>
+        <p:spPr>
+          <a:xfrm>
+            <a:off x="7272930" y="2615873"/>
+            <a:ext cx="360660" cy="218404"/>
+          </a:xfrm>
+          <a:prstGeom prst="rect">
+            <a:avLst/>
+          </a:prstGeom>
+          <a:solidFill>
+            <a:srgbClr val="F3CB91"/>
+          </a:solidFill>
+          <a:ln>
+            <a:noFill/>
+          </a:ln>
+          <a:effectLst>
+            <a:outerShdw blurRad="50800" dist="38100" dir="5400000" algn="t" rotWithShape="0">
+              <a:prstClr val="black">
+                <a:alpha val="40000"/>
+              </a:prstClr>
+            </a:outerShdw>
+          </a:effectLst>
+        </p:spPr>
+        <p:style>
+          <a:lnRef idx="2">
+            <a:schemeClr val="accent1">
+              <a:shade val="50000"/>
+            </a:schemeClr>
+          </a:lnRef>
+          <a:fillRef idx="1">
+            <a:schemeClr val="accent1"/>
+          </a:fillRef>
+          <a:effectRef idx="0">
+            <a:schemeClr val="accent1"/>
+          </a:effectRef>
+          <a:fontRef idx="minor">
+            <a:schemeClr val="lt1"/>
+          </a:fontRef>
+        </p:style>
+        <p:txBody>
+          <a:bodyPr lIns="0" tIns="0" rIns="0" bIns="0" rtlCol="0" anchor="ctr"/>
+          <a:lstStyle/>
+          <a:p>
+            <a:pPr algn="ctr"/>
+            <a:r>
+              <a:rPr lang="en-US" sz="1050" b="1" dirty="0" smtClean="0">
+                <a:solidFill>
+                  <a:schemeClr val="tx1"/>
+                </a:solidFill>
+              </a:rPr>
+              <a:t>Edit</a:t>
+            </a:r>
+            <a:endParaRPr lang="en-US" sz="1050" b="1" dirty="0">
+              <a:solidFill>
+                <a:schemeClr val="tx1"/>
+              </a:solidFill>
+            </a:endParaRPr>
+          </a:p>
+        </p:txBody>
+      </p:sp>
+      <p:sp>
+        <p:nvSpPr>
+          <p:cNvPr id="150" name="Rectangle 149"/>
+          <p:cNvSpPr/>
+          <p:nvPr/>
+        </p:nvSpPr>
+        <p:spPr>
+          <a:xfrm>
+            <a:off x="7671691" y="2615872"/>
+            <a:ext cx="499542" cy="218404"/>
+          </a:xfrm>
+          <a:prstGeom prst="rect">
+            <a:avLst/>
+          </a:prstGeom>
+          <a:solidFill>
+            <a:srgbClr val="F3CB91"/>
+          </a:solidFill>
+          <a:ln>
+            <a:noFill/>
+          </a:ln>
+          <a:effectLst>
+            <a:outerShdw blurRad="50800" dist="38100" dir="5400000" algn="t" rotWithShape="0">
+              <a:prstClr val="black">
+                <a:alpha val="40000"/>
+              </a:prstClr>
+            </a:outerShdw>
+          </a:effectLst>
+        </p:spPr>
+        <p:style>
+          <a:lnRef idx="2">
+            <a:schemeClr val="accent1">
+              <a:shade val="50000"/>
+            </a:schemeClr>
+          </a:lnRef>
+          <a:fillRef idx="1">
+            <a:schemeClr val="accent1"/>
+          </a:fillRef>
+          <a:effectRef idx="0">
+            <a:schemeClr val="accent1"/>
+          </a:effectRef>
+          <a:fontRef idx="minor">
+            <a:schemeClr val="lt1"/>
+          </a:fontRef>
+        </p:style>
+        <p:txBody>
+          <a:bodyPr lIns="0" tIns="0" rIns="0" bIns="0" rtlCol="0" anchor="ctr"/>
+          <a:lstStyle/>
+          <a:p>
+            <a:pPr algn="ctr"/>
+            <a:r>
+              <a:rPr lang="en-US" sz="1050" b="1" dirty="0" smtClean="0">
+                <a:solidFill>
+                  <a:schemeClr val="tx1"/>
+                </a:solidFill>
+              </a:rPr>
+              <a:t>Delete</a:t>
+            </a:r>
+            <a:endParaRPr lang="en-US" sz="1050" b="1" dirty="0">
+              <a:solidFill>
+                <a:schemeClr val="tx1"/>
+              </a:solidFill>
+            </a:endParaRPr>
+          </a:p>
+        </p:txBody>
+      </p:sp>
+      <p:sp>
+        <p:nvSpPr>
+          <p:cNvPr id="156" name="Rectangle 155"/>
+          <p:cNvSpPr/>
+          <p:nvPr/>
+        </p:nvSpPr>
+        <p:spPr>
+          <a:xfrm>
+            <a:off x="6890787" y="2905767"/>
+            <a:ext cx="1308579" cy="1323333"/>
+          </a:xfrm>
+          <a:prstGeom prst="rect">
+            <a:avLst/>
+          </a:prstGeom>
+          <a:solidFill>
+            <a:srgbClr val="F8E1BE"/>
+          </a:solidFill>
+          <a:ln>
+            <a:noFill/>
+          </a:ln>
+        </p:spPr>
+        <p:style>
+          <a:lnRef idx="2">
+            <a:schemeClr val="accent1">
+              <a:shade val="50000"/>
+            </a:schemeClr>
+          </a:lnRef>
+          <a:fillRef idx="1">
+            <a:schemeClr val="accent1"/>
+          </a:fillRef>
+          <a:effectRef idx="0">
+            <a:schemeClr val="accent1"/>
+          </a:effectRef>
+          <a:fontRef idx="minor">
+            <a:schemeClr val="lt1"/>
+          </a:fontRef>
+        </p:style>
+        <p:txBody>
+          <a:bodyPr rtlCol="0" anchor="ctr"/>
+          <a:lstStyle/>
+          <a:p>
+            <a:endParaRPr lang="en-US" sz="1200" b="1" dirty="0" smtClean="0">
+              <a:solidFill>
+                <a:srgbClr val="58180D"/>
+              </a:solidFill>
+            </a:endParaRPr>
+          </a:p>
+          <a:p>
+            <a:r>
+              <a:rPr lang="en-US" sz="1200" b="1" dirty="0" smtClean="0">
+                <a:solidFill>
+                  <a:srgbClr val="58180D"/>
+                </a:solidFill>
+              </a:rPr>
+              <a:t>Challenge</a:t>
+            </a:r>
+            <a:r>
+              <a:rPr lang="en-US" sz="1200" b="1" dirty="0">
+                <a:solidFill>
+                  <a:srgbClr val="58180D"/>
+                </a:solidFill>
+              </a:rPr>
+              <a:t>:</a:t>
+            </a:r>
+          </a:p>
+          <a:p>
+            <a:r>
+              <a:rPr lang="en-US" sz="1200" b="1" dirty="0">
+                <a:solidFill>
+                  <a:srgbClr val="58180D"/>
+                </a:solidFill>
+              </a:rPr>
+              <a:t>Armor Class:</a:t>
+            </a:r>
+          </a:p>
+          <a:p>
+            <a:r>
+              <a:rPr lang="en-US" sz="1200" b="1" dirty="0">
+                <a:solidFill>
+                  <a:srgbClr val="58180D"/>
+                </a:solidFill>
+              </a:rPr>
+              <a:t>Hit </a:t>
+            </a:r>
+            <a:r>
+              <a:rPr lang="en-US" sz="1200" b="1" dirty="0">
+                <a:solidFill>
+                  <a:srgbClr val="58180D"/>
+                </a:solidFill>
+              </a:rPr>
+              <a:t>Points</a:t>
+            </a:r>
+            <a:r>
+              <a:rPr lang="en-US" sz="1200" b="1" dirty="0">
+                <a:solidFill>
+                  <a:srgbClr val="58180D"/>
+                </a:solidFill>
+              </a:rPr>
+              <a:t>:</a:t>
+            </a:r>
+          </a:p>
+          <a:p>
+            <a:r>
+              <a:rPr lang="en-US" sz="1200" b="1" dirty="0">
+                <a:solidFill>
+                  <a:srgbClr val="58180D"/>
+                </a:solidFill>
+              </a:rPr>
+              <a:t>Attack Bonus:</a:t>
+            </a:r>
+          </a:p>
+          <a:p>
+            <a:r>
+              <a:rPr lang="en-US" sz="1200" b="1" dirty="0" smtClean="0">
+                <a:solidFill>
+                  <a:srgbClr val="58180D"/>
+                </a:solidFill>
+              </a:rPr>
+              <a:t>Damage:</a:t>
+            </a:r>
+            <a:endParaRPr lang="en-US" sz="1200" b="1" dirty="0">
+              <a:solidFill>
+                <a:srgbClr val="58180D"/>
+              </a:solidFill>
+            </a:endParaRPr>
+          </a:p>
+        </p:txBody>
+      </p:sp>
+      <p:sp>
+        <p:nvSpPr>
+          <p:cNvPr id="157" name="Rectangle 156"/>
+          <p:cNvSpPr/>
+          <p:nvPr/>
+        </p:nvSpPr>
+        <p:spPr>
+          <a:xfrm>
+            <a:off x="6890788" y="2905768"/>
+            <a:ext cx="1308578" cy="241932"/>
+          </a:xfrm>
+          <a:prstGeom prst="rect">
+            <a:avLst/>
+          </a:prstGeom>
+          <a:solidFill>
+            <a:srgbClr val="EFB867"/>
+          </a:solidFill>
+          <a:ln>
+            <a:noFill/>
+          </a:ln>
+          <a:effectLst>
+            <a:outerShdw blurRad="50800" dist="38100" dir="5400000" algn="t" rotWithShape="0">
+              <a:prstClr val="black">
+                <a:alpha val="40000"/>
+              </a:prstClr>
+            </a:outerShdw>
+          </a:effectLst>
+        </p:spPr>
+        <p:style>
+          <a:lnRef idx="2">
+            <a:schemeClr val="accent1">
+              <a:shade val="50000"/>
+            </a:schemeClr>
+          </a:lnRef>
+          <a:fillRef idx="1">
+            <a:schemeClr val="accent1"/>
+          </a:fillRef>
+          <a:effectRef idx="0">
+            <a:schemeClr val="accent1"/>
+          </a:effectRef>
+          <a:fontRef idx="minor">
+            <a:schemeClr val="lt1"/>
+          </a:fontRef>
+        </p:style>
+        <p:txBody>
+          <a:bodyPr lIns="91440" tIns="0" rIns="0" bIns="0" rtlCol="0" anchor="ctr"/>
+          <a:lstStyle/>
+          <a:p>
+            <a:r>
+              <a:rPr lang="en-US" sz="1200" b="1" dirty="0" smtClean="0">
+                <a:solidFill>
+                  <a:schemeClr val="tx1"/>
+                </a:solidFill>
+                <a:latin typeface="Constantia" panose="02030602050306030303" pitchFamily="18" charset="0"/>
+              </a:rPr>
+              <a:t>Count: </a:t>
+            </a:r>
+            <a:r>
+              <a:rPr lang="en-US" sz="1200" b="1" dirty="0" smtClean="0">
+                <a:solidFill>
+                  <a:schemeClr val="tx1"/>
+                </a:solidFill>
+              </a:rPr>
+              <a:t>4</a:t>
+            </a:r>
+            <a:endParaRPr lang="en-US" sz="1200" b="1" dirty="0">
+              <a:solidFill>
+                <a:schemeClr val="tx1"/>
+              </a:solidFill>
+            </a:endParaRPr>
+          </a:p>
+        </p:txBody>
+      </p:sp>
+      <p:sp>
+        <p:nvSpPr>
+          <p:cNvPr id="15" name="Rectangle 14"/>
+          <p:cNvSpPr/>
+          <p:nvPr/>
+        </p:nvSpPr>
+        <p:spPr>
+          <a:xfrm>
+            <a:off x="5792381" y="1637882"/>
+            <a:ext cx="2215863" cy="369332"/>
+          </a:xfrm>
+          <a:prstGeom prst="rect">
+            <a:avLst/>
+          </a:prstGeom>
+        </p:spPr>
+        <p:txBody>
+          <a:bodyPr wrap="none">
+            <a:spAutoFit/>
+          </a:bodyPr>
+          <a:lstStyle/>
+          <a:p>
+            <a:r>
+              <a:rPr lang="en-US" b="1" cap="small" dirty="0" smtClean="0">
+                <a:solidFill>
+                  <a:srgbClr val="58180D"/>
+                </a:solidFill>
+                <a:latin typeface="Constantia" panose="02030602050306030303" pitchFamily="18" charset="0"/>
+              </a:rPr>
+              <a:t>Desired Difficulty</a:t>
+            </a:r>
+            <a:endParaRPr lang="en-US" b="1" cap="small" dirty="0">
+              <a:solidFill>
+                <a:srgbClr val="58180D"/>
+              </a:solidFill>
+              <a:latin typeface="Constantia" panose="02030602050306030303" pitchFamily="18" charset="0"/>
             </a:endParaRPr>
           </a:p>
         </p:txBody>

</xml_diff>